<commit_message>
Added more content. Need to move to work environment.
</commit_message>
<xml_diff>
--- a/images/New Microsoft PowerPoint Presentation.pptx
+++ b/images/New Microsoft PowerPoint Presentation.pptx
@@ -4,6 +4,9 @@
   <p:sldMasterIdLst>
     <p:sldMasterId id="2147483648" r:id="rId1"/>
   </p:sldMasterIdLst>
+  <p:sldIdLst>
+    <p:sldId id="256" r:id="rId2"/>
+  </p:sldIdLst>
   <p:sldSz cx="9144000" cy="6858000" type="screen4x3"/>
   <p:notesSz cx="6858000" cy="9144000"/>
   <p:defaultTextStyle>
@@ -101,6 +104,22 @@
       </a:defRPr>
     </a:lvl9pPr>
   </p:defaultTextStyle>
+  <p:extLst>
+    <p:ext uri="{EFAFB233-063F-42B5-8137-9DF3F51BA10A}">
+      <p15:sldGuideLst xmlns:p15="http://schemas.microsoft.com/office/powerpoint/2012/main">
+        <p15:guide id="1" orient="horz" pos="2160">
+          <p15:clr>
+            <a:srgbClr val="A4A3A4"/>
+          </p15:clr>
+        </p15:guide>
+        <p15:guide id="2" pos="2880">
+          <p15:clr>
+            <a:srgbClr val="A4A3A4"/>
+          </p15:clr>
+        </p15:guide>
+      </p15:sldGuideLst>
+    </p:ext>
+  </p:extLst>
 </p:presentation>
 </file>
 
@@ -142,10 +161,9 @@
           <a:lstStyle/>
           <a:p>
             <a:r>
-              <a:rPr lang="en-US" smtClean="0"/>
+              <a:rPr lang="en-US"/>
               <a:t>Click to edit Master title style</a:t>
             </a:r>
-            <a:endParaRPr lang="en-US"/>
           </a:p>
         </p:txBody>
       </p:sp>
@@ -261,10 +279,9 @@
           </a:lstStyle>
           <a:p>
             <a:r>
-              <a:rPr lang="en-US" smtClean="0"/>
+              <a:rPr lang="en-US"/>
               <a:t>Click to edit Master subtitle style</a:t>
             </a:r>
-            <a:endParaRPr lang="en-US"/>
           </a:p>
         </p:txBody>
       </p:sp>
@@ -286,7 +303,7 @@
             <a:fld id="{1D8BD707-D9CF-40AE-B4C6-C98DA3205C09}" type="datetimeFigureOut">
               <a:rPr lang="en-US" smtClean="0"/>
               <a:pPr/>
-              <a:t>9/18/2006</a:t>
+              <a:t>4/27/2019</a:t>
             </a:fld>
             <a:endParaRPr lang="en-US"/>
           </a:p>
@@ -376,10 +393,9 @@
           <a:lstStyle/>
           <a:p>
             <a:r>
-              <a:rPr lang="en-US" smtClean="0"/>
+              <a:rPr lang="en-US"/>
               <a:t>Click to edit Master title style</a:t>
             </a:r>
-            <a:endParaRPr lang="en-US"/>
           </a:p>
         </p:txBody>
       </p:sp>
@@ -400,38 +416,37 @@
           <a:p>
             <a:pPr lvl="0"/>
             <a:r>
-              <a:rPr lang="en-US" smtClean="0"/>
+              <a:rPr lang="en-US"/>
               <a:t>Click to edit Master text styles</a:t>
             </a:r>
           </a:p>
           <a:p>
             <a:pPr lvl="1"/>
             <a:r>
-              <a:rPr lang="en-US" smtClean="0"/>
+              <a:rPr lang="en-US"/>
               <a:t>Second level</a:t>
             </a:r>
           </a:p>
           <a:p>
             <a:pPr lvl="2"/>
             <a:r>
-              <a:rPr lang="en-US" smtClean="0"/>
+              <a:rPr lang="en-US"/>
               <a:t>Third level</a:t>
             </a:r>
           </a:p>
           <a:p>
             <a:pPr lvl="3"/>
             <a:r>
-              <a:rPr lang="en-US" smtClean="0"/>
+              <a:rPr lang="en-US"/>
               <a:t>Fourth level</a:t>
             </a:r>
           </a:p>
           <a:p>
             <a:pPr lvl="4"/>
             <a:r>
-              <a:rPr lang="en-US" smtClean="0"/>
+              <a:rPr lang="en-US"/>
               <a:t>Fifth level</a:t>
             </a:r>
-            <a:endParaRPr lang="en-US"/>
           </a:p>
         </p:txBody>
       </p:sp>
@@ -453,7 +468,7 @@
             <a:fld id="{1D8BD707-D9CF-40AE-B4C6-C98DA3205C09}" type="datetimeFigureOut">
               <a:rPr lang="en-US" smtClean="0"/>
               <a:pPr/>
-              <a:t>9/18/2006</a:t>
+              <a:t>4/27/2019</a:t>
             </a:fld>
             <a:endParaRPr lang="en-US"/>
           </a:p>
@@ -548,10 +563,9 @@
           <a:lstStyle/>
           <a:p>
             <a:r>
-              <a:rPr lang="en-US" smtClean="0"/>
+              <a:rPr lang="en-US"/>
               <a:t>Click to edit Master title style</a:t>
             </a:r>
-            <a:endParaRPr lang="en-US"/>
           </a:p>
         </p:txBody>
       </p:sp>
@@ -577,38 +591,37 @@
           <a:p>
             <a:pPr lvl="0"/>
             <a:r>
-              <a:rPr lang="en-US" smtClean="0"/>
+              <a:rPr lang="en-US"/>
               <a:t>Click to edit Master text styles</a:t>
             </a:r>
           </a:p>
           <a:p>
             <a:pPr lvl="1"/>
             <a:r>
-              <a:rPr lang="en-US" smtClean="0"/>
+              <a:rPr lang="en-US"/>
               <a:t>Second level</a:t>
             </a:r>
           </a:p>
           <a:p>
             <a:pPr lvl="2"/>
             <a:r>
-              <a:rPr lang="en-US" smtClean="0"/>
+              <a:rPr lang="en-US"/>
               <a:t>Third level</a:t>
             </a:r>
           </a:p>
           <a:p>
             <a:pPr lvl="3"/>
             <a:r>
-              <a:rPr lang="en-US" smtClean="0"/>
+              <a:rPr lang="en-US"/>
               <a:t>Fourth level</a:t>
             </a:r>
           </a:p>
           <a:p>
             <a:pPr lvl="4"/>
             <a:r>
-              <a:rPr lang="en-US" smtClean="0"/>
+              <a:rPr lang="en-US"/>
               <a:t>Fifth level</a:t>
             </a:r>
-            <a:endParaRPr lang="en-US"/>
           </a:p>
         </p:txBody>
       </p:sp>
@@ -630,7 +643,7 @@
             <a:fld id="{1D8BD707-D9CF-40AE-B4C6-C98DA3205C09}" type="datetimeFigureOut">
               <a:rPr lang="en-US" smtClean="0"/>
               <a:pPr/>
-              <a:t>9/18/2006</a:t>
+              <a:t>4/27/2019</a:t>
             </a:fld>
             <a:endParaRPr lang="en-US"/>
           </a:p>
@@ -720,10 +733,9 @@
           <a:lstStyle/>
           <a:p>
             <a:r>
-              <a:rPr lang="en-US" smtClean="0"/>
+              <a:rPr lang="en-US"/>
               <a:t>Click to edit Master title style</a:t>
             </a:r>
-            <a:endParaRPr lang="en-US"/>
           </a:p>
         </p:txBody>
       </p:sp>
@@ -744,38 +756,37 @@
           <a:p>
             <a:pPr lvl="0"/>
             <a:r>
-              <a:rPr lang="en-US" smtClean="0"/>
+              <a:rPr lang="en-US"/>
               <a:t>Click to edit Master text styles</a:t>
             </a:r>
           </a:p>
           <a:p>
             <a:pPr lvl="1"/>
             <a:r>
-              <a:rPr lang="en-US" smtClean="0"/>
+              <a:rPr lang="en-US"/>
               <a:t>Second level</a:t>
             </a:r>
           </a:p>
           <a:p>
             <a:pPr lvl="2"/>
             <a:r>
-              <a:rPr lang="en-US" smtClean="0"/>
+              <a:rPr lang="en-US"/>
               <a:t>Third level</a:t>
             </a:r>
           </a:p>
           <a:p>
             <a:pPr lvl="3"/>
             <a:r>
-              <a:rPr lang="en-US" smtClean="0"/>
+              <a:rPr lang="en-US"/>
               <a:t>Fourth level</a:t>
             </a:r>
           </a:p>
           <a:p>
             <a:pPr lvl="4"/>
             <a:r>
-              <a:rPr lang="en-US" smtClean="0"/>
+              <a:rPr lang="en-US"/>
               <a:t>Fifth level</a:t>
             </a:r>
-            <a:endParaRPr lang="en-US"/>
           </a:p>
         </p:txBody>
       </p:sp>
@@ -797,7 +808,7 @@
             <a:fld id="{1D8BD707-D9CF-40AE-B4C6-C98DA3205C09}" type="datetimeFigureOut">
               <a:rPr lang="en-US" smtClean="0"/>
               <a:pPr/>
-              <a:t>9/18/2006</a:t>
+              <a:t>4/27/2019</a:t>
             </a:fld>
             <a:endParaRPr lang="en-US"/>
           </a:p>
@@ -896,10 +907,9 @@
           </a:lstStyle>
           <a:p>
             <a:r>
-              <a:rPr lang="en-US" smtClean="0"/>
+              <a:rPr lang="en-US"/>
               <a:t>Click to edit Master title style</a:t>
             </a:r>
-            <a:endParaRPr lang="en-US"/>
           </a:p>
         </p:txBody>
       </p:sp>
@@ -1016,7 +1026,7 @@
           <a:p>
             <a:pPr lvl="0"/>
             <a:r>
-              <a:rPr lang="en-US" smtClean="0"/>
+              <a:rPr lang="en-US"/>
               <a:t>Click to edit Master text styles</a:t>
             </a:r>
           </a:p>
@@ -1040,7 +1050,7 @@
             <a:fld id="{1D8BD707-D9CF-40AE-B4C6-C98DA3205C09}" type="datetimeFigureOut">
               <a:rPr lang="en-US" smtClean="0"/>
               <a:pPr/>
-              <a:t>9/18/2006</a:t>
+              <a:t>4/27/2019</a:t>
             </a:fld>
             <a:endParaRPr lang="en-US"/>
           </a:p>
@@ -1130,10 +1140,9 @@
           <a:lstStyle/>
           <a:p>
             <a:r>
-              <a:rPr lang="en-US" smtClean="0"/>
+              <a:rPr lang="en-US"/>
               <a:t>Click to edit Master title style</a:t>
             </a:r>
-            <a:endParaRPr lang="en-US"/>
           </a:p>
         </p:txBody>
       </p:sp>
@@ -1187,38 +1196,37 @@
           <a:p>
             <a:pPr lvl="0"/>
             <a:r>
-              <a:rPr lang="en-US" smtClean="0"/>
+              <a:rPr lang="en-US"/>
               <a:t>Click to edit Master text styles</a:t>
             </a:r>
           </a:p>
           <a:p>
             <a:pPr lvl="1"/>
             <a:r>
-              <a:rPr lang="en-US" smtClean="0"/>
+              <a:rPr lang="en-US"/>
               <a:t>Second level</a:t>
             </a:r>
           </a:p>
           <a:p>
             <a:pPr lvl="2"/>
             <a:r>
-              <a:rPr lang="en-US" smtClean="0"/>
+              <a:rPr lang="en-US"/>
               <a:t>Third level</a:t>
             </a:r>
           </a:p>
           <a:p>
             <a:pPr lvl="3"/>
             <a:r>
-              <a:rPr lang="en-US" smtClean="0"/>
+              <a:rPr lang="en-US"/>
               <a:t>Fourth level</a:t>
             </a:r>
           </a:p>
           <a:p>
             <a:pPr lvl="4"/>
             <a:r>
-              <a:rPr lang="en-US" smtClean="0"/>
+              <a:rPr lang="en-US"/>
               <a:t>Fifth level</a:t>
             </a:r>
-            <a:endParaRPr lang="en-US"/>
           </a:p>
         </p:txBody>
       </p:sp>
@@ -1272,38 +1280,37 @@
           <a:p>
             <a:pPr lvl="0"/>
             <a:r>
-              <a:rPr lang="en-US" smtClean="0"/>
+              <a:rPr lang="en-US"/>
               <a:t>Click to edit Master text styles</a:t>
             </a:r>
           </a:p>
           <a:p>
             <a:pPr lvl="1"/>
             <a:r>
-              <a:rPr lang="en-US" smtClean="0"/>
+              <a:rPr lang="en-US"/>
               <a:t>Second level</a:t>
             </a:r>
           </a:p>
           <a:p>
             <a:pPr lvl="2"/>
             <a:r>
-              <a:rPr lang="en-US" smtClean="0"/>
+              <a:rPr lang="en-US"/>
               <a:t>Third level</a:t>
             </a:r>
           </a:p>
           <a:p>
             <a:pPr lvl="3"/>
             <a:r>
-              <a:rPr lang="en-US" smtClean="0"/>
+              <a:rPr lang="en-US"/>
               <a:t>Fourth level</a:t>
             </a:r>
           </a:p>
           <a:p>
             <a:pPr lvl="4"/>
             <a:r>
-              <a:rPr lang="en-US" smtClean="0"/>
+              <a:rPr lang="en-US"/>
               <a:t>Fifth level</a:t>
             </a:r>
-            <a:endParaRPr lang="en-US"/>
           </a:p>
         </p:txBody>
       </p:sp>
@@ -1325,7 +1332,7 @@
             <a:fld id="{1D8BD707-D9CF-40AE-B4C6-C98DA3205C09}" type="datetimeFigureOut">
               <a:rPr lang="en-US" smtClean="0"/>
               <a:pPr/>
-              <a:t>9/18/2006</a:t>
+              <a:t>4/27/2019</a:t>
             </a:fld>
             <a:endParaRPr lang="en-US"/>
           </a:p>
@@ -1419,10 +1426,9 @@
           </a:lstStyle>
           <a:p>
             <a:r>
-              <a:rPr lang="en-US" smtClean="0"/>
+              <a:rPr lang="en-US"/>
               <a:t>Click to edit Master title style</a:t>
             </a:r>
-            <a:endParaRPr lang="en-US"/>
           </a:p>
         </p:txBody>
       </p:sp>
@@ -1485,7 +1491,7 @@
           <a:p>
             <a:pPr lvl="0"/>
             <a:r>
-              <a:rPr lang="en-US" smtClean="0"/>
+              <a:rPr lang="en-US"/>
               <a:t>Click to edit Master text styles</a:t>
             </a:r>
           </a:p>
@@ -1541,38 +1547,37 @@
           <a:p>
             <a:pPr lvl="0"/>
             <a:r>
-              <a:rPr lang="en-US" smtClean="0"/>
+              <a:rPr lang="en-US"/>
               <a:t>Click to edit Master text styles</a:t>
             </a:r>
           </a:p>
           <a:p>
             <a:pPr lvl="1"/>
             <a:r>
-              <a:rPr lang="en-US" smtClean="0"/>
+              <a:rPr lang="en-US"/>
               <a:t>Second level</a:t>
             </a:r>
           </a:p>
           <a:p>
             <a:pPr lvl="2"/>
             <a:r>
-              <a:rPr lang="en-US" smtClean="0"/>
+              <a:rPr lang="en-US"/>
               <a:t>Third level</a:t>
             </a:r>
           </a:p>
           <a:p>
             <a:pPr lvl="3"/>
             <a:r>
-              <a:rPr lang="en-US" smtClean="0"/>
+              <a:rPr lang="en-US"/>
               <a:t>Fourth level</a:t>
             </a:r>
           </a:p>
           <a:p>
             <a:pPr lvl="4"/>
             <a:r>
-              <a:rPr lang="en-US" smtClean="0"/>
+              <a:rPr lang="en-US"/>
               <a:t>Fifth level</a:t>
             </a:r>
-            <a:endParaRPr lang="en-US"/>
           </a:p>
         </p:txBody>
       </p:sp>
@@ -1635,7 +1640,7 @@
           <a:p>
             <a:pPr lvl="0"/>
             <a:r>
-              <a:rPr lang="en-US" smtClean="0"/>
+              <a:rPr lang="en-US"/>
               <a:t>Click to edit Master text styles</a:t>
             </a:r>
           </a:p>
@@ -1691,38 +1696,37 @@
           <a:p>
             <a:pPr lvl="0"/>
             <a:r>
-              <a:rPr lang="en-US" smtClean="0"/>
+              <a:rPr lang="en-US"/>
               <a:t>Click to edit Master text styles</a:t>
             </a:r>
           </a:p>
           <a:p>
             <a:pPr lvl="1"/>
             <a:r>
-              <a:rPr lang="en-US" smtClean="0"/>
+              <a:rPr lang="en-US"/>
               <a:t>Second level</a:t>
             </a:r>
           </a:p>
           <a:p>
             <a:pPr lvl="2"/>
             <a:r>
-              <a:rPr lang="en-US" smtClean="0"/>
+              <a:rPr lang="en-US"/>
               <a:t>Third level</a:t>
             </a:r>
           </a:p>
           <a:p>
             <a:pPr lvl="3"/>
             <a:r>
-              <a:rPr lang="en-US" smtClean="0"/>
+              <a:rPr lang="en-US"/>
               <a:t>Fourth level</a:t>
             </a:r>
           </a:p>
           <a:p>
             <a:pPr lvl="4"/>
             <a:r>
-              <a:rPr lang="en-US" smtClean="0"/>
+              <a:rPr lang="en-US"/>
               <a:t>Fifth level</a:t>
             </a:r>
-            <a:endParaRPr lang="en-US"/>
           </a:p>
         </p:txBody>
       </p:sp>
@@ -1744,7 +1748,7 @@
             <a:fld id="{1D8BD707-D9CF-40AE-B4C6-C98DA3205C09}" type="datetimeFigureOut">
               <a:rPr lang="en-US" smtClean="0"/>
               <a:pPr/>
-              <a:t>9/18/2006</a:t>
+              <a:t>4/27/2019</a:t>
             </a:fld>
             <a:endParaRPr lang="en-US"/>
           </a:p>
@@ -1834,10 +1838,9 @@
           <a:lstStyle/>
           <a:p>
             <a:r>
-              <a:rPr lang="en-US" smtClean="0"/>
+              <a:rPr lang="en-US"/>
               <a:t>Click to edit Master title style</a:t>
             </a:r>
-            <a:endParaRPr lang="en-US"/>
           </a:p>
         </p:txBody>
       </p:sp>
@@ -1859,7 +1862,7 @@
             <a:fld id="{1D8BD707-D9CF-40AE-B4C6-C98DA3205C09}" type="datetimeFigureOut">
               <a:rPr lang="en-US" smtClean="0"/>
               <a:pPr/>
-              <a:t>9/18/2006</a:t>
+              <a:t>4/27/2019</a:t>
             </a:fld>
             <a:endParaRPr lang="en-US"/>
           </a:p>
@@ -1951,7 +1954,7 @@
             <a:fld id="{1D8BD707-D9CF-40AE-B4C6-C98DA3205C09}" type="datetimeFigureOut">
               <a:rPr lang="en-US" smtClean="0"/>
               <a:pPr/>
-              <a:t>9/18/2006</a:t>
+              <a:t>4/27/2019</a:t>
             </a:fld>
             <a:endParaRPr lang="en-US"/>
           </a:p>
@@ -2050,10 +2053,9 @@
           </a:lstStyle>
           <a:p>
             <a:r>
-              <a:rPr lang="en-US" smtClean="0"/>
+              <a:rPr lang="en-US"/>
               <a:t>Click to edit Master title style</a:t>
             </a:r>
-            <a:endParaRPr lang="en-US"/>
           </a:p>
         </p:txBody>
       </p:sp>
@@ -2107,38 +2109,37 @@
           <a:p>
             <a:pPr lvl="0"/>
             <a:r>
-              <a:rPr lang="en-US" smtClean="0"/>
+              <a:rPr lang="en-US"/>
               <a:t>Click to edit Master text styles</a:t>
             </a:r>
           </a:p>
           <a:p>
             <a:pPr lvl="1"/>
             <a:r>
-              <a:rPr lang="en-US" smtClean="0"/>
+              <a:rPr lang="en-US"/>
               <a:t>Second level</a:t>
             </a:r>
           </a:p>
           <a:p>
             <a:pPr lvl="2"/>
             <a:r>
-              <a:rPr lang="en-US" smtClean="0"/>
+              <a:rPr lang="en-US"/>
               <a:t>Third level</a:t>
             </a:r>
           </a:p>
           <a:p>
             <a:pPr lvl="3"/>
             <a:r>
-              <a:rPr lang="en-US" smtClean="0"/>
+              <a:rPr lang="en-US"/>
               <a:t>Fourth level</a:t>
             </a:r>
           </a:p>
           <a:p>
             <a:pPr lvl="4"/>
             <a:r>
-              <a:rPr lang="en-US" smtClean="0"/>
+              <a:rPr lang="en-US"/>
               <a:t>Fifth level</a:t>
             </a:r>
-            <a:endParaRPr lang="en-US"/>
           </a:p>
         </p:txBody>
       </p:sp>
@@ -2201,7 +2202,7 @@
           <a:p>
             <a:pPr lvl="0"/>
             <a:r>
-              <a:rPr lang="en-US" smtClean="0"/>
+              <a:rPr lang="en-US"/>
               <a:t>Click to edit Master text styles</a:t>
             </a:r>
           </a:p>
@@ -2225,7 +2226,7 @@
             <a:fld id="{1D8BD707-D9CF-40AE-B4C6-C98DA3205C09}" type="datetimeFigureOut">
               <a:rPr lang="en-US" smtClean="0"/>
               <a:pPr/>
-              <a:t>9/18/2006</a:t>
+              <a:t>4/27/2019</a:t>
             </a:fld>
             <a:endParaRPr lang="en-US"/>
           </a:p>
@@ -2324,10 +2325,9 @@
           </a:lstStyle>
           <a:p>
             <a:r>
-              <a:rPr lang="en-US" smtClean="0"/>
+              <a:rPr lang="en-US"/>
               <a:t>Click to edit Master title style</a:t>
             </a:r>
-            <a:endParaRPr lang="en-US"/>
           </a:p>
         </p:txBody>
       </p:sp>
@@ -2451,7 +2451,7 @@
           <a:p>
             <a:pPr lvl="0"/>
             <a:r>
-              <a:rPr lang="en-US" smtClean="0"/>
+              <a:rPr lang="en-US"/>
               <a:t>Click to edit Master text styles</a:t>
             </a:r>
           </a:p>
@@ -2475,7 +2475,7 @@
             <a:fld id="{1D8BD707-D9CF-40AE-B4C6-C98DA3205C09}" type="datetimeFigureOut">
               <a:rPr lang="en-US" smtClean="0"/>
               <a:pPr/>
-              <a:t>9/18/2006</a:t>
+              <a:t>4/27/2019</a:t>
             </a:fld>
             <a:endParaRPr lang="en-US"/>
           </a:p>
@@ -2580,10 +2580,9 @@
           <a:lstStyle/>
           <a:p>
             <a:r>
-              <a:rPr lang="en-US" smtClean="0"/>
+              <a:rPr lang="en-US"/>
               <a:t>Click to edit Master title style</a:t>
             </a:r>
-            <a:endParaRPr lang="en-US"/>
           </a:p>
         </p:txBody>
       </p:sp>
@@ -2614,38 +2613,37 @@
           <a:p>
             <a:pPr lvl="0"/>
             <a:r>
-              <a:rPr lang="en-US" smtClean="0"/>
+              <a:rPr lang="en-US"/>
               <a:t>Click to edit Master text styles</a:t>
             </a:r>
           </a:p>
           <a:p>
             <a:pPr lvl="1"/>
             <a:r>
-              <a:rPr lang="en-US" smtClean="0"/>
+              <a:rPr lang="en-US"/>
               <a:t>Second level</a:t>
             </a:r>
           </a:p>
           <a:p>
             <a:pPr lvl="2"/>
             <a:r>
-              <a:rPr lang="en-US" smtClean="0"/>
+              <a:rPr lang="en-US"/>
               <a:t>Third level</a:t>
             </a:r>
           </a:p>
           <a:p>
             <a:pPr lvl="3"/>
             <a:r>
-              <a:rPr lang="en-US" smtClean="0"/>
+              <a:rPr lang="en-US"/>
               <a:t>Fourth level</a:t>
             </a:r>
           </a:p>
           <a:p>
             <a:pPr lvl="4"/>
             <a:r>
-              <a:rPr lang="en-US" smtClean="0"/>
+              <a:rPr lang="en-US"/>
               <a:t>Fifth level</a:t>
             </a:r>
-            <a:endParaRPr lang="en-US"/>
           </a:p>
         </p:txBody>
       </p:sp>
@@ -2685,7 +2683,7 @@
             <a:fld id="{1D8BD707-D9CF-40AE-B4C6-C98DA3205C09}" type="datetimeFigureOut">
               <a:rPr lang="en-US" smtClean="0"/>
               <a:pPr/>
-              <a:t>9/18/2006</a:t>
+              <a:t>4/27/2019</a:t>
             </a:fld>
             <a:endParaRPr lang="en-US"/>
           </a:p>
@@ -3037,6 +3035,65 @@
     </p:otherStyle>
   </p:txStyles>
 </p:sldMaster>
+</file>
+
+<file path=ppt/slides/slide1.xml><?xml version="1.0" encoding="utf-8"?>
+<p:sld xmlns:a="http://schemas.openxmlformats.org/drawingml/2006/main" xmlns:r="http://schemas.openxmlformats.org/officeDocument/2006/relationships" xmlns:p="http://schemas.openxmlformats.org/presentationml/2006/main">
+  <p:cSld>
+    <p:spTree>
+      <p:nvGrpSpPr>
+        <p:cNvPr id="1" name=""/>
+        <p:cNvGrpSpPr/>
+        <p:nvPr/>
+      </p:nvGrpSpPr>
+      <p:grpSpPr>
+        <a:xfrm>
+          <a:off x="0" y="0"/>
+          <a:ext cx="0" cy="0"/>
+          <a:chOff x="0" y="0"/>
+          <a:chExt cx="0" cy="0"/>
+        </a:xfrm>
+      </p:grpSpPr>
+      <p:pic>
+        <p:nvPicPr>
+          <p:cNvPr id="4" name="Picture 3">
+            <a:extLst>
+              <a:ext uri="{FF2B5EF4-FFF2-40B4-BE49-F238E27FC236}">
+                <a16:creationId xmlns:a16="http://schemas.microsoft.com/office/drawing/2014/main" id="{D6776EC1-D6AF-4B3A-8B29-94CF151602E1}"/>
+              </a:ext>
+            </a:extLst>
+          </p:cNvPr>
+          <p:cNvPicPr>
+            <a:picLocks noChangeAspect="1"/>
+          </p:cNvPicPr>
+          <p:nvPr/>
+        </p:nvPicPr>
+        <p:blipFill rotWithShape="1">
+          <a:blip r:embed="rId2"/>
+          <a:srcRect l="23947" t="20181" r="17059" b="60373"/>
+          <a:stretch/>
+        </p:blipFill>
+        <p:spPr>
+          <a:xfrm>
+            <a:off x="0" y="2057400"/>
+            <a:ext cx="9160687" cy="2590800"/>
+          </a:xfrm>
+          <a:prstGeom prst="rect">
+            <a:avLst/>
+          </a:prstGeom>
+        </p:spPr>
+      </p:pic>
+    </p:spTree>
+    <p:extLst>
+      <p:ext uri="{BB962C8B-B14F-4D97-AF65-F5344CB8AC3E}">
+        <p14:creationId xmlns:p14="http://schemas.microsoft.com/office/powerpoint/2010/main" val="2718495921"/>
+      </p:ext>
+    </p:extLst>
+  </p:cSld>
+  <p:clrMapOvr>
+    <a:masterClrMapping/>
+  </p:clrMapOvr>
+</p:sld>
 </file>
 
 <file path=ppt/theme/theme1.xml><?xml version="1.0" encoding="utf-8"?>

</xml_diff>